<commit_message>
Updated outline and powerpoint
</commit_message>
<xml_diff>
--- a/Ben R Thesis Figures.pptx
+++ b/Ben R Thesis Figures.pptx
@@ -6,6 +6,10 @@
   </p:sldMasterIdLst>
   <p:sldIdLst>
     <p:sldId id="256" r:id="rId2"/>
+    <p:sldId id="257" r:id="rId3"/>
+    <p:sldId id="259" r:id="rId4"/>
+    <p:sldId id="260" r:id="rId5"/>
+    <p:sldId id="258" r:id="rId6"/>
   </p:sldIdLst>
   <p:sldSz cx="9144000" cy="6858000" type="screen4x3"/>
   <p:notesSz cx="6858000" cy="9144000"/>
@@ -288,7 +292,7 @@
           <a:p>
             <a:fld id="{1F451CEF-8A26-6A49-B960-6754B21B13BA}" type="datetimeFigureOut">
               <a:rPr lang="en-US" smtClean="0"/>
-              <a:t>12/14/14</a:t>
+              <a:t>12/15/14</a:t>
             </a:fld>
             <a:endParaRPr lang="en-US"/>
           </a:p>
@@ -458,7 +462,7 @@
           <a:p>
             <a:fld id="{1F451CEF-8A26-6A49-B960-6754B21B13BA}" type="datetimeFigureOut">
               <a:rPr lang="en-US" smtClean="0"/>
-              <a:t>12/14/14</a:t>
+              <a:t>12/15/14</a:t>
             </a:fld>
             <a:endParaRPr lang="en-US"/>
           </a:p>
@@ -638,7 +642,7 @@
           <a:p>
             <a:fld id="{1F451CEF-8A26-6A49-B960-6754B21B13BA}" type="datetimeFigureOut">
               <a:rPr lang="en-US" smtClean="0"/>
-              <a:t>12/14/14</a:t>
+              <a:t>12/15/14</a:t>
             </a:fld>
             <a:endParaRPr lang="en-US"/>
           </a:p>
@@ -808,7 +812,7 @@
           <a:p>
             <a:fld id="{1F451CEF-8A26-6A49-B960-6754B21B13BA}" type="datetimeFigureOut">
               <a:rPr lang="en-US" smtClean="0"/>
-              <a:t>12/14/14</a:t>
+              <a:t>12/15/14</a:t>
             </a:fld>
             <a:endParaRPr lang="en-US"/>
           </a:p>
@@ -1054,7 +1058,7 @@
           <a:p>
             <a:fld id="{1F451CEF-8A26-6A49-B960-6754B21B13BA}" type="datetimeFigureOut">
               <a:rPr lang="en-US" smtClean="0"/>
-              <a:t>12/14/14</a:t>
+              <a:t>12/15/14</a:t>
             </a:fld>
             <a:endParaRPr lang="en-US"/>
           </a:p>
@@ -1342,7 +1346,7 @@
           <a:p>
             <a:fld id="{1F451CEF-8A26-6A49-B960-6754B21B13BA}" type="datetimeFigureOut">
               <a:rPr lang="en-US" smtClean="0"/>
-              <a:t>12/14/14</a:t>
+              <a:t>12/15/14</a:t>
             </a:fld>
             <a:endParaRPr lang="en-US"/>
           </a:p>
@@ -1764,7 +1768,7 @@
           <a:p>
             <a:fld id="{1F451CEF-8A26-6A49-B960-6754B21B13BA}" type="datetimeFigureOut">
               <a:rPr lang="en-US" smtClean="0"/>
-              <a:t>12/14/14</a:t>
+              <a:t>12/15/14</a:t>
             </a:fld>
             <a:endParaRPr lang="en-US"/>
           </a:p>
@@ -1882,7 +1886,7 @@
           <a:p>
             <a:fld id="{1F451CEF-8A26-6A49-B960-6754B21B13BA}" type="datetimeFigureOut">
               <a:rPr lang="en-US" smtClean="0"/>
-              <a:t>12/14/14</a:t>
+              <a:t>12/15/14</a:t>
             </a:fld>
             <a:endParaRPr lang="en-US"/>
           </a:p>
@@ -1977,7 +1981,7 @@
           <a:p>
             <a:fld id="{1F451CEF-8A26-6A49-B960-6754B21B13BA}" type="datetimeFigureOut">
               <a:rPr lang="en-US" smtClean="0"/>
-              <a:t>12/14/14</a:t>
+              <a:t>12/15/14</a:t>
             </a:fld>
             <a:endParaRPr lang="en-US"/>
           </a:p>
@@ -2254,7 +2258,7 @@
           <a:p>
             <a:fld id="{1F451CEF-8A26-6A49-B960-6754B21B13BA}" type="datetimeFigureOut">
               <a:rPr lang="en-US" smtClean="0"/>
-              <a:t>12/14/14</a:t>
+              <a:t>12/15/14</a:t>
             </a:fld>
             <a:endParaRPr lang="en-US"/>
           </a:p>
@@ -2507,7 +2511,7 @@
           <a:p>
             <a:fld id="{1F451CEF-8A26-6A49-B960-6754B21B13BA}" type="datetimeFigureOut">
               <a:rPr lang="en-US" smtClean="0"/>
-              <a:t>12/14/14</a:t>
+              <a:t>12/15/14</a:t>
             </a:fld>
             <a:endParaRPr lang="en-US"/>
           </a:p>
@@ -2720,7 +2724,7 @@
           <a:p>
             <a:fld id="{1F451CEF-8A26-6A49-B960-6754B21B13BA}" type="datetimeFigureOut">
               <a:rPr lang="en-US" smtClean="0"/>
-              <a:t>12/14/14</a:t>
+              <a:t>12/15/14</a:t>
             </a:fld>
             <a:endParaRPr lang="en-US"/>
           </a:p>
@@ -3122,11 +3126,7 @@
             </a:r>
             <a:r>
               <a:rPr lang="en-US" dirty="0" smtClean="0"/>
-              <a:t> </a:t>
-            </a:r>
-            <a:r>
-              <a:rPr lang="en-US" dirty="0" smtClean="0"/>
-              <a:t>Algorithm To Predict </a:t>
+              <a:t> Algorithm To Predict </a:t>
             </a:r>
             <a:r>
               <a:rPr lang="en-US" dirty="0"/>
@@ -3149,7 +3149,11 @@
             </a:r>
             <a:r>
               <a:rPr lang="en-US" dirty="0"/>
-              <a:t>and tables</a:t>
+              <a:t>and </a:t>
+            </a:r>
+            <a:r>
+              <a:rPr lang="en-US" dirty="0" smtClean="0"/>
+              <a:t>Tables</a:t>
             </a:r>
             <a:endParaRPr lang="en-US" dirty="0"/>
           </a:p>
@@ -3175,11 +3179,7 @@
           <a:p>
             <a:r>
               <a:rPr lang="en-US" dirty="0" smtClean="0"/>
-              <a:t>By </a:t>
-            </a:r>
-            <a:r>
-              <a:rPr lang="en-US" dirty="0" smtClean="0"/>
-              <a:t>Benjamin Rogers</a:t>
+              <a:t>By Benjamin Rogers</a:t>
             </a:r>
             <a:endParaRPr lang="en-US" dirty="0"/>
           </a:p>
@@ -3189,6 +3189,328 @@
     <p:extLst>
       <p:ext uri="{BB962C8B-B14F-4D97-AF65-F5344CB8AC3E}">
         <p14:creationId xmlns:p14="http://schemas.microsoft.com/office/powerpoint/2010/main" val="2013501188"/>
+      </p:ext>
+    </p:extLst>
+  </p:cSld>
+  <p:clrMapOvr>
+    <a:masterClrMapping/>
+  </p:clrMapOvr>
+</p:sld>
+</file>
+
+<file path=ppt/slides/slide2.xml><?xml version="1.0" encoding="utf-8"?>
+<p:sld xmlns:a="http://schemas.openxmlformats.org/drawingml/2006/main" xmlns:r="http://schemas.openxmlformats.org/officeDocument/2006/relationships" xmlns:p="http://schemas.openxmlformats.org/presentationml/2006/main">
+  <p:cSld>
+    <p:spTree>
+      <p:nvGrpSpPr>
+        <p:cNvPr id="1" name=""/>
+        <p:cNvGrpSpPr/>
+        <p:nvPr/>
+      </p:nvGrpSpPr>
+      <p:grpSpPr>
+        <a:xfrm>
+          <a:off x="0" y="0"/>
+          <a:ext cx="0" cy="0"/>
+          <a:chOff x="0" y="0"/>
+          <a:chExt cx="0" cy="0"/>
+        </a:xfrm>
+      </p:grpSpPr>
+      <p:sp>
+        <p:nvSpPr>
+          <p:cNvPr id="2" name="Title 1"/>
+          <p:cNvSpPr>
+            <a:spLocks noGrp="1"/>
+          </p:cNvSpPr>
+          <p:nvPr>
+            <p:ph type="title"/>
+          </p:nvPr>
+        </p:nvSpPr>
+        <p:spPr/>
+        <p:txBody>
+          <a:bodyPr/>
+          <a:lstStyle/>
+          <a:p>
+            <a:r>
+              <a:rPr lang="en-US" dirty="0" smtClean="0"/>
+              <a:t>Histogram of Collected Data</a:t>
+            </a:r>
+            <a:endParaRPr lang="en-US" dirty="0"/>
+          </a:p>
+        </p:txBody>
+      </p:sp>
+      <p:pic>
+        <p:nvPicPr>
+          <p:cNvPr id="4" name="Content Placeholder 3" descr="Screen Shot 2014-11-19 at 10.01.06 PM.png"/>
+          <p:cNvPicPr>
+            <a:picLocks noGrp="1" noChangeAspect="1"/>
+          </p:cNvPicPr>
+          <p:nvPr>
+            <p:ph idx="1"/>
+          </p:nvPr>
+        </p:nvPicPr>
+        <p:blipFill>
+          <a:blip r:embed="rId2">
+            <a:extLst>
+              <a:ext uri="{28A0092B-C50C-407E-A947-70E740481C1C}">
+                <a14:useLocalDpi xmlns:a14="http://schemas.microsoft.com/office/drawing/2010/main" val="0"/>
+              </a:ext>
+            </a:extLst>
+          </a:blip>
+          <a:srcRect l="-41014" r="-41014"/>
+          <a:stretch>
+            <a:fillRect/>
+          </a:stretch>
+        </p:blipFill>
+        <p:spPr/>
+      </p:pic>
+    </p:spTree>
+    <p:extLst>
+      <p:ext uri="{BB962C8B-B14F-4D97-AF65-F5344CB8AC3E}">
+        <p14:creationId xmlns:p14="http://schemas.microsoft.com/office/powerpoint/2010/main" val="1452332779"/>
+      </p:ext>
+    </p:extLst>
+  </p:cSld>
+  <p:clrMapOvr>
+    <a:masterClrMapping/>
+  </p:clrMapOvr>
+</p:sld>
+</file>
+
+<file path=ppt/slides/slide3.xml><?xml version="1.0" encoding="utf-8"?>
+<p:sld xmlns:a="http://schemas.openxmlformats.org/drawingml/2006/main" xmlns:r="http://schemas.openxmlformats.org/officeDocument/2006/relationships" xmlns:p="http://schemas.openxmlformats.org/presentationml/2006/main">
+  <p:cSld>
+    <p:spTree>
+      <p:nvGrpSpPr>
+        <p:cNvPr id="1" name=""/>
+        <p:cNvGrpSpPr/>
+        <p:nvPr/>
+      </p:nvGrpSpPr>
+      <p:grpSpPr>
+        <a:xfrm>
+          <a:off x="0" y="0"/>
+          <a:ext cx="0" cy="0"/>
+          <a:chOff x="0" y="0"/>
+          <a:chExt cx="0" cy="0"/>
+        </a:xfrm>
+      </p:grpSpPr>
+      <p:sp>
+        <p:nvSpPr>
+          <p:cNvPr id="2" name="Title 1"/>
+          <p:cNvSpPr>
+            <a:spLocks noGrp="1"/>
+          </p:cNvSpPr>
+          <p:nvPr>
+            <p:ph type="title"/>
+          </p:nvPr>
+        </p:nvSpPr>
+        <p:spPr/>
+        <p:txBody>
+          <a:bodyPr>
+            <a:normAutofit/>
+          </a:bodyPr>
+          <a:lstStyle/>
+          <a:p>
+            <a:r>
+              <a:rPr lang="en-US" dirty="0" smtClean="0"/>
+              <a:t>Bootstrapped Data Results</a:t>
+            </a:r>
+            <a:endParaRPr lang="en-US" dirty="0"/>
+          </a:p>
+        </p:txBody>
+      </p:sp>
+      <p:pic>
+        <p:nvPicPr>
+          <p:cNvPr id="5" name="Content Placeholder 3" descr="Screen Shot 2014-12-15 at 3.09.51 PM.png"/>
+          <p:cNvPicPr>
+            <a:picLocks noChangeAspect="1"/>
+          </p:cNvPicPr>
+          <p:nvPr/>
+        </p:nvPicPr>
+        <p:blipFill>
+          <a:blip r:embed="rId2">
+            <a:extLst>
+              <a:ext uri="{28A0092B-C50C-407E-A947-70E740481C1C}">
+                <a14:useLocalDpi xmlns:a14="http://schemas.microsoft.com/office/drawing/2010/main" val="0"/>
+              </a:ext>
+            </a:extLst>
+          </a:blip>
+          <a:srcRect l="7685" r="7685"/>
+          <a:stretch>
+            <a:fillRect/>
+          </a:stretch>
+        </p:blipFill>
+        <p:spPr>
+          <a:xfrm>
+            <a:off x="2512218" y="1600200"/>
+            <a:ext cx="4116388" cy="4525963"/>
+          </a:xfrm>
+          <a:prstGeom prst="rect">
+            <a:avLst/>
+          </a:prstGeom>
+        </p:spPr>
+      </p:pic>
+    </p:spTree>
+    <p:extLst>
+      <p:ext uri="{BB962C8B-B14F-4D97-AF65-F5344CB8AC3E}">
+        <p14:creationId xmlns:p14="http://schemas.microsoft.com/office/powerpoint/2010/main" val="260374987"/>
+      </p:ext>
+    </p:extLst>
+  </p:cSld>
+  <p:clrMapOvr>
+    <a:masterClrMapping/>
+  </p:clrMapOvr>
+</p:sld>
+</file>
+
+<file path=ppt/slides/slide4.xml><?xml version="1.0" encoding="utf-8"?>
+<p:sld xmlns:a="http://schemas.openxmlformats.org/drawingml/2006/main" xmlns:r="http://schemas.openxmlformats.org/officeDocument/2006/relationships" xmlns:p="http://schemas.openxmlformats.org/presentationml/2006/main">
+  <p:cSld>
+    <p:spTree>
+      <p:nvGrpSpPr>
+        <p:cNvPr id="1" name=""/>
+        <p:cNvGrpSpPr/>
+        <p:nvPr/>
+      </p:nvGrpSpPr>
+      <p:grpSpPr>
+        <a:xfrm>
+          <a:off x="0" y="0"/>
+          <a:ext cx="0" cy="0"/>
+          <a:chOff x="0" y="0"/>
+          <a:chExt cx="0" cy="0"/>
+        </a:xfrm>
+      </p:grpSpPr>
+      <p:sp>
+        <p:nvSpPr>
+          <p:cNvPr id="2" name="Title 1"/>
+          <p:cNvSpPr>
+            <a:spLocks noGrp="1"/>
+          </p:cNvSpPr>
+          <p:nvPr>
+            <p:ph type="title"/>
+          </p:nvPr>
+        </p:nvSpPr>
+        <p:spPr/>
+        <p:txBody>
+          <a:bodyPr>
+            <a:normAutofit fontScale="90000"/>
+          </a:bodyPr>
+          <a:lstStyle/>
+          <a:p>
+            <a:r>
+              <a:rPr lang="en-US" dirty="0" smtClean="0"/>
+              <a:t>Treatment Contrasts of Bootstrapped Data Analysis</a:t>
+            </a:r>
+            <a:endParaRPr lang="en-US" dirty="0"/>
+          </a:p>
+        </p:txBody>
+      </p:sp>
+      <p:pic>
+        <p:nvPicPr>
+          <p:cNvPr id="6" name="Content Placeholder 5" descr="Screen Shot 2014-12-15 at 3.15.11 PM.png"/>
+          <p:cNvPicPr>
+            <a:picLocks noGrp="1" noChangeAspect="1"/>
+          </p:cNvPicPr>
+          <p:nvPr>
+            <p:ph idx="1"/>
+          </p:nvPr>
+        </p:nvPicPr>
+        <p:blipFill>
+          <a:blip r:embed="rId2">
+            <a:extLst>
+              <a:ext uri="{28A0092B-C50C-407E-A947-70E740481C1C}">
+                <a14:useLocalDpi xmlns:a14="http://schemas.microsoft.com/office/drawing/2010/main" val="0"/>
+              </a:ext>
+            </a:extLst>
+          </a:blip>
+          <a:srcRect l="-56094" r="-56094"/>
+          <a:stretch>
+            <a:fillRect/>
+          </a:stretch>
+        </p:blipFill>
+        <p:spPr/>
+      </p:pic>
+    </p:spTree>
+    <p:extLst>
+      <p:ext uri="{BB962C8B-B14F-4D97-AF65-F5344CB8AC3E}">
+        <p14:creationId xmlns:p14="http://schemas.microsoft.com/office/powerpoint/2010/main" val="1690673121"/>
+      </p:ext>
+    </p:extLst>
+  </p:cSld>
+  <p:clrMapOvr>
+    <a:masterClrMapping/>
+  </p:clrMapOvr>
+</p:sld>
+</file>
+
+<file path=ppt/slides/slide5.xml><?xml version="1.0" encoding="utf-8"?>
+<p:sld xmlns:a="http://schemas.openxmlformats.org/drawingml/2006/main" xmlns:r="http://schemas.openxmlformats.org/officeDocument/2006/relationships" xmlns:p="http://schemas.openxmlformats.org/presentationml/2006/main">
+  <p:cSld>
+    <p:spTree>
+      <p:nvGrpSpPr>
+        <p:cNvPr id="1" name=""/>
+        <p:cNvGrpSpPr/>
+        <p:nvPr/>
+      </p:nvGrpSpPr>
+      <p:grpSpPr>
+        <a:xfrm>
+          <a:off x="0" y="0"/>
+          <a:ext cx="0" cy="0"/>
+          <a:chOff x="0" y="0"/>
+          <a:chExt cx="0" cy="0"/>
+        </a:xfrm>
+      </p:grpSpPr>
+      <p:sp>
+        <p:nvSpPr>
+          <p:cNvPr id="2" name="Title 1"/>
+          <p:cNvSpPr>
+            <a:spLocks noGrp="1"/>
+          </p:cNvSpPr>
+          <p:nvPr>
+            <p:ph type="title"/>
+          </p:nvPr>
+        </p:nvSpPr>
+        <p:spPr/>
+        <p:txBody>
+          <a:bodyPr/>
+          <a:lstStyle/>
+          <a:p>
+            <a:r>
+              <a:rPr lang="en-US" dirty="0" smtClean="0"/>
+              <a:t>Density Plot of Results</a:t>
+            </a:r>
+            <a:endParaRPr lang="en-US" dirty="0"/>
+          </a:p>
+        </p:txBody>
+      </p:sp>
+      <p:pic>
+        <p:nvPicPr>
+          <p:cNvPr id="4" name="Content Placeholder 3" descr="Density Plots for Thesis.png"/>
+          <p:cNvPicPr>
+            <a:picLocks noGrp="1" noChangeAspect="1"/>
+          </p:cNvPicPr>
+          <p:nvPr>
+            <p:ph idx="1"/>
+          </p:nvPr>
+        </p:nvPicPr>
+        <p:blipFill>
+          <a:blip r:embed="rId2">
+            <a:extLst>
+              <a:ext uri="{28A0092B-C50C-407E-A947-70E740481C1C}">
+                <a14:useLocalDpi xmlns:a14="http://schemas.microsoft.com/office/drawing/2010/main" val="0"/>
+              </a:ext>
+            </a:extLst>
+          </a:blip>
+          <a:srcRect l="-40652" r="-40652"/>
+          <a:stretch>
+            <a:fillRect/>
+          </a:stretch>
+        </p:blipFill>
+        <p:spPr/>
+      </p:pic>
+    </p:spTree>
+    <p:extLst>
+      <p:ext uri="{BB962C8B-B14F-4D97-AF65-F5344CB8AC3E}">
+        <p14:creationId xmlns:p14="http://schemas.microsoft.com/office/powerpoint/2010/main" val="201724275"/>
       </p:ext>
     </p:extLst>
   </p:cSld>

</xml_diff>